<commit_message>
full set of computations
</commit_message>
<xml_diff>
--- a/For_Naaman/orbitals/FrontierOrbitalsAnalysis.pptx
+++ b/For_Naaman/orbitals/FrontierOrbitalsAnalysis.pptx
@@ -3840,7 +3840,7 @@
         </p:blipFill>
         <p:spPr>
           <a:xfrm>
-            <a:off x="739452" y="494488"/>
+            <a:off x="7419652" y="394611"/>
             <a:ext cx="4608046" cy="4077832"/>
           </a:xfrm>
           <a:prstGeom prst="rect">
@@ -3869,7 +3869,7 @@
         </p:blipFill>
         <p:spPr>
           <a:xfrm>
-            <a:off x="722853" y="4756036"/>
+            <a:off x="7403053" y="4656159"/>
             <a:ext cx="4608046" cy="4350576"/>
           </a:xfrm>
           <a:prstGeom prst="rect">
@@ -3898,8 +3898,8 @@
         </p:blipFill>
         <p:spPr>
           <a:xfrm>
-            <a:off x="791065" y="9279202"/>
-            <a:ext cx="4476585" cy="4350576"/>
+            <a:off x="7471265" y="9179325"/>
+            <a:ext cx="4476585" cy="4350577"/>
           </a:xfrm>
           <a:prstGeom prst="rect">
             <a:avLst/>
@@ -3917,7 +3917,7 @@
         </p:nvSpPr>
         <p:spPr>
           <a:xfrm>
-            <a:off x="1999007" y="119930"/>
+            <a:off x="8679207" y="20053"/>
             <a:ext cx="1265908" cy="635001"/>
           </a:xfrm>
           <a:prstGeom prst="rect">
@@ -3962,7 +3962,7 @@
         </p:nvSpPr>
         <p:spPr>
           <a:xfrm>
-            <a:off x="2075344" y="4827407"/>
+            <a:off x="8755544" y="4727530"/>
             <a:ext cx="1113235" cy="469901"/>
           </a:xfrm>
           <a:prstGeom prst="rect">
@@ -4007,7 +4007,7 @@
         </p:nvSpPr>
         <p:spPr>
           <a:xfrm>
-            <a:off x="2100719" y="9279202"/>
+            <a:off x="8780919" y="9179325"/>
             <a:ext cx="1062485" cy="469901"/>
           </a:xfrm>
           <a:prstGeom prst="rect">
@@ -4062,8 +4062,8 @@
         </p:blipFill>
         <p:spPr>
           <a:xfrm>
-            <a:off x="7065520" y="4909847"/>
-            <a:ext cx="4476584" cy="4376469"/>
+            <a:off x="13745720" y="4809970"/>
+            <a:ext cx="4476585" cy="4376469"/>
           </a:xfrm>
           <a:prstGeom prst="rect">
             <a:avLst/>
@@ -4091,8 +4091,8 @@
         </p:blipFill>
         <p:spPr>
           <a:xfrm>
-            <a:off x="7078762" y="9279202"/>
-            <a:ext cx="4450100" cy="4350576"/>
+            <a:off x="13758962" y="9179325"/>
+            <a:ext cx="4450100" cy="4350577"/>
           </a:xfrm>
           <a:prstGeom prst="rect">
             <a:avLst/>
@@ -4110,8 +4110,8 @@
         </p:nvSpPr>
         <p:spPr>
           <a:xfrm>
-            <a:off x="8577744" y="4827407"/>
-            <a:ext cx="1113235" cy="469901"/>
+            <a:off x="15257943" y="4727530"/>
+            <a:ext cx="1113236" cy="469901"/>
           </a:xfrm>
           <a:prstGeom prst="rect">
             <a:avLst/>
@@ -4155,7 +4155,7 @@
         </p:nvSpPr>
         <p:spPr>
           <a:xfrm>
-            <a:off x="8603119" y="9279202"/>
+            <a:off x="15283319" y="9179325"/>
             <a:ext cx="1062485" cy="469901"/>
           </a:xfrm>
           <a:prstGeom prst="rect">
@@ -4210,7 +4210,7 @@
         </p:blipFill>
         <p:spPr>
           <a:xfrm>
-            <a:off x="7055436" y="192120"/>
+            <a:off x="13735636" y="92243"/>
             <a:ext cx="4496752" cy="4682568"/>
           </a:xfrm>
           <a:prstGeom prst="rect">
@@ -4229,7 +4229,7 @@
         </p:nvSpPr>
         <p:spPr>
           <a:xfrm>
-            <a:off x="8501407" y="119930"/>
+            <a:off x="15181607" y="20053"/>
             <a:ext cx="1265908" cy="635001"/>
           </a:xfrm>
           <a:prstGeom prst="rect">
@@ -4274,7 +4274,7 @@
         </p:nvSpPr>
         <p:spPr>
           <a:xfrm>
-            <a:off x="6535996" y="7051971"/>
+            <a:off x="13216196" y="6952094"/>
             <a:ext cx="1917205" cy="469901"/>
           </a:xfrm>
           <a:prstGeom prst="rect">
@@ -4322,7 +4322,7 @@
         </p:nvSpPr>
         <p:spPr>
           <a:xfrm>
-            <a:off x="6535996" y="10069384"/>
+            <a:off x="13216196" y="9969507"/>
             <a:ext cx="1917205" cy="469901"/>
           </a:xfrm>
           <a:prstGeom prst="rect">
@@ -4370,7 +4370,7 @@
         </p:nvSpPr>
         <p:spPr>
           <a:xfrm>
-            <a:off x="6631196" y="8528928"/>
+            <a:off x="13311396" y="8429051"/>
             <a:ext cx="1726804" cy="533401"/>
           </a:xfrm>
           <a:prstGeom prst="rect">
@@ -4421,7 +4421,7 @@
         </p:nvSpPr>
         <p:spPr>
           <a:xfrm flipV="1">
-            <a:off x="7408362" y="7509525"/>
+            <a:off x="14088562" y="7409648"/>
             <a:ext cx="1" cy="949481"/>
           </a:xfrm>
           <a:prstGeom prst="line">
@@ -4451,7 +4451,7 @@
         </p:nvSpPr>
         <p:spPr>
           <a:xfrm>
-            <a:off x="7369690" y="9162464"/>
+            <a:off x="14049890" y="9062587"/>
             <a:ext cx="1" cy="949481"/>
           </a:xfrm>
           <a:prstGeom prst="line">
@@ -4481,7 +4481,7 @@
         </p:nvSpPr>
         <p:spPr>
           <a:xfrm>
-            <a:off x="139032" y="7354806"/>
+            <a:off x="6819232" y="7254929"/>
             <a:ext cx="1917205" cy="469901"/>
           </a:xfrm>
           <a:prstGeom prst="rect">
@@ -4529,7 +4529,7 @@
         </p:nvSpPr>
         <p:spPr>
           <a:xfrm>
-            <a:off x="220813" y="10069384"/>
+            <a:off x="6901013" y="9969507"/>
             <a:ext cx="1753642" cy="469901"/>
           </a:xfrm>
           <a:prstGeom prst="rect">
@@ -4577,7 +4577,7 @@
         </p:nvSpPr>
         <p:spPr>
           <a:xfrm>
-            <a:off x="254001" y="8693045"/>
+            <a:off x="6934201" y="8593168"/>
             <a:ext cx="1701404" cy="508001"/>
           </a:xfrm>
           <a:prstGeom prst="rect">
@@ -4628,7 +4628,7 @@
         </p:nvSpPr>
         <p:spPr>
           <a:xfrm flipV="1">
-            <a:off x="1110620" y="7696635"/>
+            <a:off x="7790820" y="7596758"/>
             <a:ext cx="1" cy="949481"/>
           </a:xfrm>
           <a:prstGeom prst="line">
@@ -4657,9 +4657,9 @@
           <p:nvPr/>
         </p:nvSpPr>
         <p:spPr>
-          <a:xfrm flipH="1">
-            <a:off x="1059248" y="9286075"/>
-            <a:ext cx="1" cy="949481"/>
+          <a:xfrm>
+            <a:off x="7739448" y="9186197"/>
+            <a:ext cx="1" cy="949482"/>
           </a:xfrm>
           <a:prstGeom prst="line">
             <a:avLst/>
@@ -4698,7 +4698,7 @@
         </p:blipFill>
         <p:spPr>
           <a:xfrm>
-            <a:off x="12472729" y="4958492"/>
+            <a:off x="19152929" y="4858615"/>
             <a:ext cx="4735544" cy="4226346"/>
           </a:xfrm>
           <a:prstGeom prst="rect">
@@ -4727,8 +4727,8 @@
         </p:blipFill>
         <p:spPr>
           <a:xfrm>
-            <a:off x="12555733" y="9546355"/>
-            <a:ext cx="4569536" cy="4097069"/>
+            <a:off x="19235933" y="9446478"/>
+            <a:ext cx="4569537" cy="4097069"/>
           </a:xfrm>
           <a:prstGeom prst="rect">
             <a:avLst/>
@@ -4756,8 +4756,8 @@
         </p:blipFill>
         <p:spPr>
           <a:xfrm>
-            <a:off x="12739426" y="323365"/>
-            <a:ext cx="4735545" cy="4540311"/>
+            <a:off x="19419627" y="223487"/>
+            <a:ext cx="4735544" cy="4540311"/>
           </a:xfrm>
           <a:prstGeom prst="rect">
             <a:avLst/>
@@ -4775,8 +4775,8 @@
         </p:nvSpPr>
         <p:spPr>
           <a:xfrm>
-            <a:off x="14140343" y="4738507"/>
-            <a:ext cx="1113236" cy="469901"/>
+            <a:off x="20820543" y="4638630"/>
+            <a:ext cx="1113235" cy="469901"/>
           </a:xfrm>
           <a:prstGeom prst="rect">
             <a:avLst/>
@@ -4820,7 +4820,7 @@
         </p:nvSpPr>
         <p:spPr>
           <a:xfrm>
-            <a:off x="14165719" y="9190302"/>
+            <a:off x="20845918" y="9090425"/>
             <a:ext cx="1062485" cy="469901"/>
           </a:xfrm>
           <a:prstGeom prst="rect">
@@ -4865,7 +4865,7 @@
         </p:nvSpPr>
         <p:spPr>
           <a:xfrm>
-            <a:off x="14171957" y="119930"/>
+            <a:off x="20852156" y="20053"/>
             <a:ext cx="1050008" cy="635001"/>
           </a:xfrm>
           <a:prstGeom prst="rect">
@@ -4910,7 +4910,7 @@
         </p:nvSpPr>
         <p:spPr>
           <a:xfrm>
-            <a:off x="11698048" y="6963071"/>
+            <a:off x="18378248" y="6863194"/>
             <a:ext cx="1917205" cy="469901"/>
           </a:xfrm>
           <a:prstGeom prst="rect">
@@ -4958,7 +4958,7 @@
         </p:nvSpPr>
         <p:spPr>
           <a:xfrm>
-            <a:off x="11865083" y="9802684"/>
+            <a:off x="18545283" y="9702807"/>
             <a:ext cx="1917205" cy="469901"/>
           </a:xfrm>
           <a:prstGeom prst="rect">
@@ -5006,8 +5006,8 @@
         </p:nvSpPr>
         <p:spPr>
           <a:xfrm>
-            <a:off x="11972983" y="8452728"/>
-            <a:ext cx="1701404" cy="508001"/>
+            <a:off x="18653183" y="8352851"/>
+            <a:ext cx="1701405" cy="508001"/>
           </a:xfrm>
           <a:prstGeom prst="rect">
             <a:avLst/>
@@ -5057,7 +5057,7 @@
         </p:nvSpPr>
         <p:spPr>
           <a:xfrm flipV="1">
-            <a:off x="12804921" y="7430918"/>
+            <a:off x="19485121" y="7331041"/>
             <a:ext cx="1" cy="949481"/>
           </a:xfrm>
           <a:prstGeom prst="line">
@@ -5087,7 +5087,7 @@
         </p:nvSpPr>
         <p:spPr>
           <a:xfrm>
-            <a:off x="12804349" y="8969557"/>
+            <a:off x="19484549" y="8869680"/>
             <a:ext cx="1" cy="949481"/>
           </a:xfrm>
           <a:prstGeom prst="line">
@@ -5106,6 +5106,615 @@
           <a:lstStyle/>
           <a:p>
             <a:pPr/>
+          </a:p>
+        </p:txBody>
+      </p:sp>
+      <p:pic>
+        <p:nvPicPr>
+          <p:cNvPr id="184" name="Image" descr="Image"/>
+          <p:cNvPicPr>
+            <a:picLocks noChangeAspect="1"/>
+          </p:cNvPicPr>
+          <p:nvPr/>
+        </p:nvPicPr>
+        <p:blipFill>
+          <a:blip r:embed="rId11">
+            <a:extLst/>
+          </a:blip>
+          <a:stretch>
+            <a:fillRect/>
+          </a:stretch>
+        </p:blipFill>
+        <p:spPr>
+          <a:xfrm>
+            <a:off x="1989157" y="4982202"/>
+            <a:ext cx="4450099" cy="4021175"/>
+          </a:xfrm>
+          <a:prstGeom prst="rect">
+            <a:avLst/>
+          </a:prstGeom>
+          <a:ln w="12700">
+            <a:miter lim="400000"/>
+          </a:ln>
+        </p:spPr>
+      </p:pic>
+      <p:pic>
+        <p:nvPicPr>
+          <p:cNvPr id="185" name="Image" descr="Image"/>
+          <p:cNvPicPr>
+            <a:picLocks noChangeAspect="1"/>
+          </p:cNvPicPr>
+          <p:nvPr/>
+        </p:nvPicPr>
+        <p:blipFill>
+          <a:blip r:embed="rId12">
+            <a:extLst/>
+          </a:blip>
+          <a:stretch>
+            <a:fillRect/>
+          </a:stretch>
+        </p:blipFill>
+        <p:spPr>
+          <a:xfrm>
+            <a:off x="1471064" y="9159212"/>
+            <a:ext cx="4978084" cy="4409684"/>
+          </a:xfrm>
+          <a:prstGeom prst="rect">
+            <a:avLst/>
+          </a:prstGeom>
+          <a:ln w="12700">
+            <a:miter lim="400000"/>
+          </a:ln>
+        </p:spPr>
+      </p:pic>
+      <p:pic>
+        <p:nvPicPr>
+          <p:cNvPr id="186" name="Image" descr="Image"/>
+          <p:cNvPicPr>
+            <a:picLocks noChangeAspect="1"/>
+          </p:cNvPicPr>
+          <p:nvPr/>
+        </p:nvPicPr>
+        <p:blipFill>
+          <a:blip r:embed="rId13">
+            <a:extLst/>
+          </a:blip>
+          <a:stretch>
+            <a:fillRect/>
+          </a:stretch>
+        </p:blipFill>
+        <p:spPr>
+          <a:xfrm>
+            <a:off x="1776953" y="331799"/>
+            <a:ext cx="4608046" cy="4203455"/>
+          </a:xfrm>
+          <a:prstGeom prst="rect">
+            <a:avLst/>
+          </a:prstGeom>
+          <a:ln w="12700">
+            <a:miter lim="400000"/>
+          </a:ln>
+        </p:spPr>
+      </p:pic>
+      <p:sp>
+        <p:nvSpPr>
+          <p:cNvPr id="187" name="HS-25"/>
+          <p:cNvSpPr txBox="1"/>
+          <p:nvPr/>
+        </p:nvSpPr>
+        <p:spPr>
+          <a:xfrm>
+            <a:off x="1579907" y="7353"/>
+            <a:ext cx="1265908" cy="635001"/>
+          </a:xfrm>
+          <a:prstGeom prst="rect">
+            <a:avLst/>
+          </a:prstGeom>
+          <a:ln w="12700">
+            <a:miter lim="400000"/>
+          </a:ln>
+          <a:extLst>
+            <a:ext uri="{C572A759-6A51-4108-AA02-DFA0A04FC94B}">
+              <ma14:wrappingTextBoxFlag xmlns:ma14="http://schemas.microsoft.com/office/mac/drawingml/2011/main" val="1"/>
+            </a:ext>
+          </a:extLst>
+        </p:spPr>
+        <p:txBody>
+          <a:bodyPr wrap="none" lIns="50800" tIns="50800" rIns="50800" bIns="50800" anchor="ctr">
+            <a:spAutoFit/>
+          </a:bodyPr>
+          <a:lstStyle>
+            <a:lvl1pPr>
+              <a:defRPr b="1" sz="3400">
+                <a:latin typeface="Times Roman"/>
+                <a:ea typeface="Times Roman"/>
+                <a:cs typeface="Times Roman"/>
+                <a:sym typeface="Times Roman"/>
+              </a:defRPr>
+            </a:lvl1pPr>
+          </a:lstStyle>
+          <a:p>
+            <a:pPr/>
+            <a:r>
+              <a:t>HS-25</a:t>
+            </a:r>
+          </a:p>
+        </p:txBody>
+      </p:sp>
+      <p:sp>
+        <p:nvSpPr>
+          <p:cNvPr id="188" name="HOMO"/>
+          <p:cNvSpPr txBox="1"/>
+          <p:nvPr/>
+        </p:nvSpPr>
+        <p:spPr>
+          <a:xfrm>
+            <a:off x="1656243" y="4714830"/>
+            <a:ext cx="1113236" cy="469901"/>
+          </a:xfrm>
+          <a:prstGeom prst="rect">
+            <a:avLst/>
+          </a:prstGeom>
+          <a:ln w="12700">
+            <a:miter lim="400000"/>
+          </a:ln>
+          <a:extLst>
+            <a:ext uri="{C572A759-6A51-4108-AA02-DFA0A04FC94B}">
+              <ma14:wrappingTextBoxFlag xmlns:ma14="http://schemas.microsoft.com/office/mac/drawingml/2011/main" val="1"/>
+            </a:ext>
+          </a:extLst>
+        </p:spPr>
+        <p:txBody>
+          <a:bodyPr wrap="none" lIns="50800" tIns="50800" rIns="50800" bIns="50800" anchor="ctr">
+            <a:spAutoFit/>
+          </a:bodyPr>
+          <a:lstStyle>
+            <a:lvl1pPr>
+              <a:defRPr b="1">
+                <a:latin typeface="Times Roman"/>
+                <a:ea typeface="Times Roman"/>
+                <a:cs typeface="Times Roman"/>
+                <a:sym typeface="Times Roman"/>
+              </a:defRPr>
+            </a:lvl1pPr>
+          </a:lstStyle>
+          <a:p>
+            <a:pPr/>
+            <a:r>
+              <a:t>HOMO</a:t>
+            </a:r>
+          </a:p>
+        </p:txBody>
+      </p:sp>
+      <p:sp>
+        <p:nvSpPr>
+          <p:cNvPr id="189" name="LUMO"/>
+          <p:cNvSpPr txBox="1"/>
+          <p:nvPr/>
+        </p:nvSpPr>
+        <p:spPr>
+          <a:xfrm>
+            <a:off x="1681619" y="9166625"/>
+            <a:ext cx="1062485" cy="469901"/>
+          </a:xfrm>
+          <a:prstGeom prst="rect">
+            <a:avLst/>
+          </a:prstGeom>
+          <a:ln w="12700">
+            <a:miter lim="400000"/>
+          </a:ln>
+          <a:extLst>
+            <a:ext uri="{C572A759-6A51-4108-AA02-DFA0A04FC94B}">
+              <ma14:wrappingTextBoxFlag xmlns:ma14="http://schemas.microsoft.com/office/mac/drawingml/2011/main" val="1"/>
+            </a:ext>
+          </a:extLst>
+        </p:spPr>
+        <p:txBody>
+          <a:bodyPr wrap="none" lIns="50800" tIns="50800" rIns="50800" bIns="50800" anchor="ctr">
+            <a:spAutoFit/>
+          </a:bodyPr>
+          <a:lstStyle>
+            <a:lvl1pPr>
+              <a:defRPr b="1">
+                <a:latin typeface="Times Roman"/>
+                <a:ea typeface="Times Roman"/>
+                <a:cs typeface="Times Roman"/>
+                <a:sym typeface="Times Roman"/>
+              </a:defRPr>
+            </a:lvl1pPr>
+          </a:lstStyle>
+          <a:p>
+            <a:pPr/>
+            <a:r>
+              <a:t>LUMO</a:t>
+            </a:r>
+          </a:p>
+        </p:txBody>
+      </p:sp>
+      <p:sp>
+        <p:nvSpPr>
+          <p:cNvPr id="190" name="-5.687182[eV]"/>
+          <p:cNvSpPr txBox="1"/>
+          <p:nvPr/>
+        </p:nvSpPr>
+        <p:spPr>
+          <a:xfrm>
+            <a:off x="84682" y="8294718"/>
+            <a:ext cx="1917205" cy="469901"/>
+          </a:xfrm>
+          <a:prstGeom prst="rect">
+            <a:avLst/>
+          </a:prstGeom>
+          <a:ln w="12700">
+            <a:miter lim="400000"/>
+          </a:ln>
+          <a:extLst>
+            <a:ext uri="{C572A759-6A51-4108-AA02-DFA0A04FC94B}">
+              <ma14:wrappingTextBoxFlag xmlns:ma14="http://schemas.microsoft.com/office/mac/drawingml/2011/main" val="1"/>
+            </a:ext>
+          </a:extLst>
+        </p:spPr>
+        <p:txBody>
+          <a:bodyPr wrap="none" lIns="50800" tIns="50800" rIns="50800" bIns="50800" anchor="ctr">
+            <a:spAutoFit/>
+          </a:bodyPr>
+          <a:lstStyle>
+            <a:lvl1pPr>
+              <a:defRPr u="sng">
+                <a:latin typeface="Times Roman"/>
+                <a:ea typeface="Times Roman"/>
+                <a:cs typeface="Times Roman"/>
+                <a:sym typeface="Times Roman"/>
+              </a:defRPr>
+            </a:lvl1pPr>
+          </a:lstStyle>
+          <a:p>
+            <a:pPr>
+              <a:defRPr u="none"/>
+            </a:pPr>
+            <a:r>
+              <a:rPr u="sng"/>
+              <a:t>-5.687182[eV]</a:t>
+            </a:r>
+          </a:p>
+        </p:txBody>
+      </p:sp>
+      <p:sp>
+        <p:nvSpPr>
+          <p:cNvPr id="191" name="-3.564693[eV]"/>
+          <p:cNvSpPr txBox="1"/>
+          <p:nvPr/>
+        </p:nvSpPr>
+        <p:spPr>
+          <a:xfrm>
+            <a:off x="84682" y="11009296"/>
+            <a:ext cx="1917205" cy="469901"/>
+          </a:xfrm>
+          <a:prstGeom prst="rect">
+            <a:avLst/>
+          </a:prstGeom>
+          <a:ln w="12700">
+            <a:miter lim="400000"/>
+          </a:ln>
+          <a:extLst>
+            <a:ext uri="{C572A759-6A51-4108-AA02-DFA0A04FC94B}">
+              <ma14:wrappingTextBoxFlag xmlns:ma14="http://schemas.microsoft.com/office/mac/drawingml/2011/main" val="1"/>
+            </a:ext>
+          </a:extLst>
+        </p:spPr>
+        <p:txBody>
+          <a:bodyPr wrap="none" lIns="50800" tIns="50800" rIns="50800" bIns="50800" anchor="ctr">
+            <a:spAutoFit/>
+          </a:bodyPr>
+          <a:lstStyle>
+            <a:lvl1pPr>
+              <a:defRPr u="sng">
+                <a:latin typeface="Times Roman"/>
+                <a:ea typeface="Times Roman"/>
+                <a:cs typeface="Times Roman"/>
+                <a:sym typeface="Times Roman"/>
+              </a:defRPr>
+            </a:lvl1pPr>
+          </a:lstStyle>
+          <a:p>
+            <a:pPr>
+              <a:defRPr u="none"/>
+            </a:pPr>
+            <a:r>
+              <a:rPr u="sng"/>
+              <a:t>-3.564693[eV]</a:t>
+            </a:r>
+          </a:p>
+        </p:txBody>
+      </p:sp>
+      <p:sp>
+        <p:nvSpPr>
+          <p:cNvPr id="192" name="2.12249[eV]"/>
+          <p:cNvSpPr txBox="1"/>
+          <p:nvPr/>
+        </p:nvSpPr>
+        <p:spPr>
+          <a:xfrm>
+            <a:off x="199651" y="9632957"/>
+            <a:ext cx="1701405" cy="508001"/>
+          </a:xfrm>
+          <a:prstGeom prst="rect">
+            <a:avLst/>
+          </a:prstGeom>
+          <a:ln w="38100">
+            <a:solidFill>
+              <a:srgbClr val="000000"/>
+            </a:solidFill>
+            <a:miter lim="400000"/>
+          </a:ln>
+          <a:extLst>
+            <a:ext uri="{C572A759-6A51-4108-AA02-DFA0A04FC94B}">
+              <ma14:wrappingTextBoxFlag xmlns:ma14="http://schemas.microsoft.com/office/mac/drawingml/2011/main" val="1"/>
+            </a:ext>
+          </a:extLst>
+        </p:spPr>
+        <p:txBody>
+          <a:bodyPr wrap="none" lIns="50800" tIns="50800" rIns="50800" bIns="50800" anchor="ctr">
+            <a:spAutoFit/>
+          </a:bodyPr>
+          <a:lstStyle>
+            <a:lvl1pPr algn="l" defTabSz="457200">
+              <a:defRPr>
+                <a:solidFill>
+                  <a:srgbClr val="000000"/>
+                </a:solidFill>
+                <a:latin typeface="Times Roman"/>
+                <a:ea typeface="Times Roman"/>
+                <a:cs typeface="Times Roman"/>
+                <a:sym typeface="Times Roman"/>
+              </a:defRPr>
+            </a:lvl1pPr>
+          </a:lstStyle>
+          <a:p>
+            <a:pPr/>
+            <a:r>
+              <a:t>2.12249[eV]</a:t>
+            </a:r>
+          </a:p>
+        </p:txBody>
+      </p:sp>
+      <p:sp>
+        <p:nvSpPr>
+          <p:cNvPr id="193" name="Line"/>
+          <p:cNvSpPr/>
+          <p:nvPr/>
+        </p:nvSpPr>
+        <p:spPr>
+          <a:xfrm flipV="1">
+            <a:off x="1056270" y="8636547"/>
+            <a:ext cx="1" cy="949481"/>
+          </a:xfrm>
+          <a:prstGeom prst="line">
+            <a:avLst/>
+          </a:prstGeom>
+          <a:ln w="38100">
+            <a:solidFill>
+              <a:srgbClr val="000000"/>
+            </a:solidFill>
+            <a:miter lim="400000"/>
+            <a:tailEnd type="triangle"/>
+          </a:ln>
+        </p:spPr>
+        <p:txBody>
+          <a:bodyPr lIns="50800" tIns="50800" rIns="50800" bIns="50800" anchor="ctr"/>
+          <a:lstStyle/>
+          <a:p>
+            <a:pPr/>
+          </a:p>
+        </p:txBody>
+      </p:sp>
+      <p:sp>
+        <p:nvSpPr>
+          <p:cNvPr id="194" name="Line"/>
+          <p:cNvSpPr/>
+          <p:nvPr/>
+        </p:nvSpPr>
+        <p:spPr>
+          <a:xfrm flipH="1">
+            <a:off x="1004898" y="10225987"/>
+            <a:ext cx="1" cy="949481"/>
+          </a:xfrm>
+          <a:prstGeom prst="line">
+            <a:avLst/>
+          </a:prstGeom>
+          <a:ln w="38100">
+            <a:solidFill>
+              <a:srgbClr val="000000"/>
+            </a:solidFill>
+            <a:miter lim="400000"/>
+            <a:tailEnd type="triangle"/>
+          </a:ln>
+        </p:spPr>
+        <p:txBody>
+          <a:bodyPr lIns="50800" tIns="50800" rIns="50800" bIns="50800" anchor="ctr"/>
+          <a:lstStyle/>
+          <a:p>
+            <a:pPr/>
+          </a:p>
+        </p:txBody>
+      </p:sp>
+      <p:sp>
+        <p:nvSpPr>
+          <p:cNvPr id="195" name="E=-2615.490075[Eh]"/>
+          <p:cNvSpPr txBox="1"/>
+          <p:nvPr/>
+        </p:nvSpPr>
+        <p:spPr>
+          <a:xfrm>
+            <a:off x="2327050" y="4052918"/>
+            <a:ext cx="2715668" cy="469901"/>
+          </a:xfrm>
+          <a:prstGeom prst="rect">
+            <a:avLst/>
+          </a:prstGeom>
+          <a:ln w="12700">
+            <a:miter lim="400000"/>
+          </a:ln>
+          <a:extLst>
+            <a:ext uri="{C572A759-6A51-4108-AA02-DFA0A04FC94B}">
+              <ma14:wrappingTextBoxFlag xmlns:ma14="http://schemas.microsoft.com/office/mac/drawingml/2011/main" val="1"/>
+            </a:ext>
+          </a:extLst>
+        </p:spPr>
+        <p:txBody>
+          <a:bodyPr wrap="none" lIns="50800" tIns="50800" rIns="50800" bIns="50800" anchor="ctr">
+            <a:spAutoFit/>
+          </a:bodyPr>
+          <a:lstStyle>
+            <a:lvl1pPr>
+              <a:defRPr>
+                <a:latin typeface="Times Roman"/>
+                <a:ea typeface="Times Roman"/>
+                <a:cs typeface="Times Roman"/>
+                <a:sym typeface="Times Roman"/>
+              </a:defRPr>
+            </a:lvl1pPr>
+          </a:lstStyle>
+          <a:p>
+            <a:pPr/>
+            <a:r>
+              <a:t>E=-2615.490075[Eh]</a:t>
+            </a:r>
+          </a:p>
+        </p:txBody>
+      </p:sp>
+      <p:sp>
+        <p:nvSpPr>
+          <p:cNvPr id="196" name="E=-2282.296827[Eh]"/>
+          <p:cNvSpPr txBox="1"/>
+          <p:nvPr/>
+        </p:nvSpPr>
+        <p:spPr>
+          <a:xfrm>
+            <a:off x="7419652" y="3223486"/>
+            <a:ext cx="2715668" cy="469901"/>
+          </a:xfrm>
+          <a:prstGeom prst="rect">
+            <a:avLst/>
+          </a:prstGeom>
+          <a:ln w="12700">
+            <a:miter lim="400000"/>
+          </a:ln>
+          <a:extLst>
+            <a:ext uri="{C572A759-6A51-4108-AA02-DFA0A04FC94B}">
+              <ma14:wrappingTextBoxFlag xmlns:ma14="http://schemas.microsoft.com/office/mac/drawingml/2011/main" val="1"/>
+            </a:ext>
+          </a:extLst>
+        </p:spPr>
+        <p:txBody>
+          <a:bodyPr wrap="none" lIns="50800" tIns="50800" rIns="50800" bIns="50800" anchor="ctr">
+            <a:spAutoFit/>
+          </a:bodyPr>
+          <a:lstStyle>
+            <a:lvl1pPr>
+              <a:defRPr>
+                <a:latin typeface="Times Roman"/>
+                <a:ea typeface="Times Roman"/>
+                <a:cs typeface="Times Roman"/>
+                <a:sym typeface="Times Roman"/>
+              </a:defRPr>
+            </a:lvl1pPr>
+          </a:lstStyle>
+          <a:p>
+            <a:pPr/>
+            <a:r>
+              <a:t>E=-2282.296827[Eh]</a:t>
+            </a:r>
+          </a:p>
+        </p:txBody>
+      </p:sp>
+      <p:sp>
+        <p:nvSpPr>
+          <p:cNvPr id="197" name="E=-2755.712356[Eh]"/>
+          <p:cNvSpPr txBox="1"/>
+          <p:nvPr/>
+        </p:nvSpPr>
+        <p:spPr>
+          <a:xfrm>
+            <a:off x="13591852" y="3557000"/>
+            <a:ext cx="2715668" cy="469901"/>
+          </a:xfrm>
+          <a:prstGeom prst="rect">
+            <a:avLst/>
+          </a:prstGeom>
+          <a:ln w="12700">
+            <a:miter lim="400000"/>
+          </a:ln>
+          <a:extLst>
+            <a:ext uri="{C572A759-6A51-4108-AA02-DFA0A04FC94B}">
+              <ma14:wrappingTextBoxFlag xmlns:ma14="http://schemas.microsoft.com/office/mac/drawingml/2011/main" val="1"/>
+            </a:ext>
+          </a:extLst>
+        </p:spPr>
+        <p:txBody>
+          <a:bodyPr wrap="none" lIns="50800" tIns="50800" rIns="50800" bIns="50800" anchor="ctr">
+            <a:spAutoFit/>
+          </a:bodyPr>
+          <a:lstStyle>
+            <a:lvl1pPr>
+              <a:defRPr>
+                <a:latin typeface="Times Roman"/>
+                <a:ea typeface="Times Roman"/>
+                <a:cs typeface="Times Roman"/>
+                <a:sym typeface="Times Roman"/>
+              </a:defRPr>
+            </a:lvl1pPr>
+          </a:lstStyle>
+          <a:p>
+            <a:pPr/>
+            <a:r>
+              <a:t>E=-2755.712356[Eh]</a:t>
+            </a:r>
+          </a:p>
+        </p:txBody>
+      </p:sp>
+      <p:sp>
+        <p:nvSpPr>
+          <p:cNvPr id="198" name="E=-2422.518237[Eh]"/>
+          <p:cNvSpPr txBox="1"/>
+          <p:nvPr/>
+        </p:nvSpPr>
+        <p:spPr>
+          <a:xfrm>
+            <a:off x="19154452" y="3557000"/>
+            <a:ext cx="2715668" cy="469901"/>
+          </a:xfrm>
+          <a:prstGeom prst="rect">
+            <a:avLst/>
+          </a:prstGeom>
+          <a:ln w="12700">
+            <a:miter lim="400000"/>
+          </a:ln>
+          <a:extLst>
+            <a:ext uri="{C572A759-6A51-4108-AA02-DFA0A04FC94B}">
+              <ma14:wrappingTextBoxFlag xmlns:ma14="http://schemas.microsoft.com/office/mac/drawingml/2011/main" val="1"/>
+            </a:ext>
+          </a:extLst>
+        </p:spPr>
+        <p:txBody>
+          <a:bodyPr wrap="none" lIns="50800" tIns="50800" rIns="50800" bIns="50800" anchor="ctr">
+            <a:spAutoFit/>
+          </a:bodyPr>
+          <a:lstStyle>
+            <a:lvl1pPr>
+              <a:defRPr>
+                <a:latin typeface="Times Roman"/>
+                <a:ea typeface="Times Roman"/>
+                <a:cs typeface="Times Roman"/>
+                <a:sym typeface="Times Roman"/>
+              </a:defRPr>
+            </a:lvl1pPr>
+          </a:lstStyle>
+          <a:p>
+            <a:pPr/>
+            <a:r>
+              <a:t>E=-2422.518237[Eh]</a:t>
+            </a:r>
           </a:p>
         </p:txBody>
       </p:sp>

</xml_diff>